<commit_message>
day 1 sept 17
</commit_message>
<xml_diff>
--- a/day_1_sept_17/NodeJS_Demo.pptx
+++ b/day_1_sept_17/NodeJS_Demo.pptx
@@ -13917,13 +13917,8 @@
             </a:r>
             <a:r>
               <a:rPr lang="en-US" dirty="0"/>
-              <a:t>1 hour </a:t>
-            </a:r>
-            <a:r>
-              <a:rPr lang="en-US"/>
-              <a:t>daily 08.30am to 09.30am</a:t>
-            </a:r>
-            <a:endParaRPr lang="en-US" dirty="0"/>
+              <a:t>1 hour daily 08.30am to 09.30am</a:t>
+            </a:r>
           </a:p>
           <a:p>
             <a:r>
@@ -13981,15 +13976,7 @@
           <a:p>
             <a:r>
               <a:rPr lang="en-IN" dirty="0"/>
-              <a:t>Fee - </a:t>
-            </a:r>
-            <a:r>
-              <a:rPr lang="en-IN" dirty="0" err="1"/>
-              <a:t>NareshIT</a:t>
-            </a:r>
-            <a:r>
-              <a:rPr lang="en-IN" dirty="0"/>
-              <a:t> Admin/management</a:t>
+              <a:t>Fee – 5000 (only live session)  , 8000 (live session + class recordings)</a:t>
             </a:r>
           </a:p>
           <a:p>
@@ -14764,6 +14751,30 @@
               </a:rPr>
               <a:t>Express Framework-routes</a:t>
             </a:r>
+          </a:p>
+          <a:p>
+            <a:r>
+              <a:rPr lang="en-IN" kern="100" dirty="0">
+                <a:latin typeface="Calibri" panose="020F0502020204030204" pitchFamily="34" charset="0"/>
+                <a:ea typeface="Calibri" panose="020F0502020204030204" pitchFamily="34" charset="0"/>
+                <a:cs typeface="Calibri" panose="020F0502020204030204" pitchFamily="34" charset="0"/>
+              </a:rPr>
+              <a:t>Express </a:t>
+            </a:r>
+            <a:r>
+              <a:rPr lang="en-IN" kern="100" dirty="0" err="1">
+                <a:latin typeface="Calibri" panose="020F0502020204030204" pitchFamily="34" charset="0"/>
+                <a:ea typeface="Calibri" panose="020F0502020204030204" pitchFamily="34" charset="0"/>
+                <a:cs typeface="Calibri" panose="020F0502020204030204" pitchFamily="34" charset="0"/>
+              </a:rPr>
+              <a:t>Middlewares</a:t>
+            </a:r>
+            <a:endParaRPr lang="en-IN" sz="1800" kern="100" dirty="0">
+              <a:effectLst/>
+              <a:latin typeface="Calibri" panose="020F0502020204030204" pitchFamily="34" charset="0"/>
+              <a:ea typeface="Calibri" panose="020F0502020204030204" pitchFamily="34" charset="0"/>
+              <a:cs typeface="Calibri" panose="020F0502020204030204" pitchFamily="34" charset="0"/>
+            </a:endParaRPr>
           </a:p>
           <a:p>
             <a:r>

</xml_diff>